<commit_message>
2018.03~06 in DataBase Programming
</commit_message>
<xml_diff>
--- a/PPT.pptx
+++ b/PPT.pptx
@@ -13601,9 +13601,9 @@
         <p:grpSpPr>
           <a:xfrm>
             <a:off x="786270" y="2268416"/>
-            <a:ext cx="1641796" cy="585268"/>
+            <a:ext cx="1704313" cy="585268"/>
             <a:chOff x="946521" y="5082030"/>
-            <a:chExt cx="1641796" cy="585268"/>
+            <a:chExt cx="1704313" cy="585268"/>
           </a:xfrm>
         </p:grpSpPr>
         <p:sp>
@@ -13826,7 +13826,7 @@
           <p:spPr bwMode="auto">
             <a:xfrm>
               <a:off x="946521" y="5082030"/>
-              <a:ext cx="1641796" cy="307777"/>
+              <a:ext cx="1704313" cy="307777"/>
             </a:xfrm>
             <a:prstGeom prst="rect">
               <a:avLst/>
@@ -14020,7 +14020,7 @@
                 <a:t>01. </a:t>
               </a:r>
               <a:r>
-                <a:rPr kumimoji="0" lang="ko-KR" altLang="en-US" sz="1400" b="1" dirty="0">
+                <a:rPr kumimoji="0" lang="ko-KR" altLang="en-US" sz="1400" b="1">
                   <a:solidFill>
                     <a:schemeClr val="bg2">
                       <a:lumMod val="50000"/>
@@ -14029,7 +14029,7 @@
                   <a:latin typeface="+mn-ea"/>
                   <a:ea typeface="+mn-ea"/>
                 </a:rPr>
-                <a:t>프로그램 소개</a:t>
+                <a:t>프로그램 소개 </a:t>
               </a:r>
               <a:endParaRPr kumimoji="0" lang="en-US" altLang="ko-KR" sz="1400" b="1" dirty="0">
                 <a:solidFill>

</xml_diff>